<commit_message>
changes to pptx -- god knows what
</commit_message>
<xml_diff>
--- a/UnitTesting.pptx
+++ b/UnitTesting.pptx
@@ -20,8 +20,8 @@
     <p:sldId id="328" r:id="rId44"/>
     <p:sldId id="330" r:id="rId45"/>
     <p:sldId id="323" r:id="rId46"/>
-    <p:sldId id="325" r:id="rId47"/>
-    <p:sldId id="333" r:id="rId48"/>
+    <p:sldId id="333" r:id="rId47"/>
+    <p:sldId id="325" r:id="rId48"/>
     <p:sldId id="327" r:id="rId49"/>
     <p:sldId id="329" r:id="rId50"/>
     <p:sldId id="336" r:id="rId51"/>
@@ -155,8 +155,8 @@
             <p14:sldId id="328"/>
             <p14:sldId id="330"/>
             <p14:sldId id="323"/>
+            <p14:sldId id="333"/>
             <p14:sldId id="325"/>
-            <p14:sldId id="333"/>
             <p14:sldId id="327"/>
             <p14:sldId id="329"/>
             <p14:sldId id="336"/>
@@ -280,7 +280,7 @@
           <a:p>
             <a:fld id="{46C003B6-BCEA-46F3-841E-7B3EC6052E68}" type="datetimeFigureOut">
               <a:rPr lang="en-BE" smtClean="0"/>
-              <a:t>25/08/2022</a:t>
+              <a:t>06/03/2024</a:t>
             </a:fld>
             <a:endParaRPr lang="en-BE"/>
           </a:p>
@@ -1138,7 +1138,71 @@
               <a:buFont typeface="Arial" panose="020B0604020202020204" pitchFamily="34" charset="0"/>
               <a:buNone/>
             </a:pPr>
-            <a:endParaRPr lang="en-BE" dirty="0"/>
+            <a:r>
+              <a:rPr lang="en-US" b="1" dirty="0"/>
+              <a:t>State</a:t>
+            </a:r>
+            <a:r>
+              <a:rPr lang="en-US" dirty="0"/>
+              <a:t>:</a:t>
+            </a:r>
+          </a:p>
+          <a:p>
+            <a:pPr marL="0" indent="0">
+              <a:buFont typeface="Arial" panose="020B0604020202020204" pitchFamily="34" charset="0"/>
+              <a:buNone/>
+            </a:pPr>
+            <a:r>
+              <a:rPr lang="en-US" dirty="0"/>
+              <a:t>When updating an entity, the audit fields </a:t>
+            </a:r>
+            <a:r>
+              <a:rPr lang="en-US" dirty="0" err="1"/>
+              <a:t>LastModifiedBy</a:t>
+            </a:r>
+            <a:r>
+              <a:rPr lang="en-US" dirty="0"/>
+              <a:t> and </a:t>
+            </a:r>
+            <a:r>
+              <a:rPr lang="en-US" dirty="0" err="1"/>
+              <a:t>LastModifiedOn</a:t>
+            </a:r>
+            <a:r>
+              <a:rPr lang="en-US" dirty="0"/>
+              <a:t> are properly updated. Checking the value of properties of the class.</a:t>
+            </a:r>
+          </a:p>
+          <a:p>
+            <a:pPr marL="0" indent="0">
+              <a:buFont typeface="Arial" panose="020B0604020202020204" pitchFamily="34" charset="0"/>
+              <a:buNone/>
+            </a:pPr>
+            <a:endParaRPr lang="en-US" dirty="0"/>
+          </a:p>
+          <a:p>
+            <a:pPr marL="0" indent="0">
+              <a:buFont typeface="Arial" panose="020B0604020202020204" pitchFamily="34" charset="0"/>
+              <a:buNone/>
+            </a:pPr>
+            <a:r>
+              <a:rPr lang="en-US" b="1" dirty="0"/>
+              <a:t>Behavior</a:t>
+            </a:r>
+            <a:r>
+              <a:rPr lang="en-US" dirty="0"/>
+              <a:t>:</a:t>
+            </a:r>
+          </a:p>
+          <a:p>
+            <a:pPr marL="0" indent="0">
+              <a:buFont typeface="Arial" panose="020B0604020202020204" pitchFamily="34" charset="0"/>
+              <a:buNone/>
+            </a:pPr>
+            <a:r>
+              <a:rPr lang="en-US" dirty="0"/>
+              <a:t>Verify that a method was (not) called, or called with specific arguments.</a:t>
+            </a:r>
           </a:p>
         </p:txBody>
       </p:sp>
@@ -1168,7 +1232,7 @@
     </p:spTree>
     <p:extLst>
       <p:ext uri="{BB962C8B-B14F-4D97-AF65-F5344CB8AC3E}">
-        <p14:creationId xmlns:p14="http://schemas.microsoft.com/office/powerpoint/2010/main" val="4101160565"/>
+        <p14:creationId xmlns:p14="http://schemas.microsoft.com/office/powerpoint/2010/main" val="1592903963"/>
       </p:ext>
     </p:extLst>
   </p:cSld>
@@ -1226,71 +1290,7 @@
               <a:buFont typeface="Arial" panose="020B0604020202020204" pitchFamily="34" charset="0"/>
               <a:buNone/>
             </a:pPr>
-            <a:r>
-              <a:rPr lang="en-US" b="1" dirty="0"/>
-              <a:t>State</a:t>
-            </a:r>
-            <a:r>
-              <a:rPr lang="en-US" dirty="0"/>
-              <a:t>:</a:t>
-            </a:r>
-          </a:p>
-          <a:p>
-            <a:pPr marL="0" indent="0">
-              <a:buFont typeface="Arial" panose="020B0604020202020204" pitchFamily="34" charset="0"/>
-              <a:buNone/>
-            </a:pPr>
-            <a:r>
-              <a:rPr lang="en-US" dirty="0"/>
-              <a:t>When updating an entity, the audit fields </a:t>
-            </a:r>
-            <a:r>
-              <a:rPr lang="en-US" dirty="0" err="1"/>
-              <a:t>LastModifiedBy</a:t>
-            </a:r>
-            <a:r>
-              <a:rPr lang="en-US" dirty="0"/>
-              <a:t> and </a:t>
-            </a:r>
-            <a:r>
-              <a:rPr lang="en-US" dirty="0" err="1"/>
-              <a:t>LastModifiedOn</a:t>
-            </a:r>
-            <a:r>
-              <a:rPr lang="en-US" dirty="0"/>
-              <a:t> are properly updated. Checking the value of properties of the class.</a:t>
-            </a:r>
-          </a:p>
-          <a:p>
-            <a:pPr marL="0" indent="0">
-              <a:buFont typeface="Arial" panose="020B0604020202020204" pitchFamily="34" charset="0"/>
-              <a:buNone/>
-            </a:pPr>
-            <a:endParaRPr lang="en-US" dirty="0"/>
-          </a:p>
-          <a:p>
-            <a:pPr marL="0" indent="0">
-              <a:buFont typeface="Arial" panose="020B0604020202020204" pitchFamily="34" charset="0"/>
-              <a:buNone/>
-            </a:pPr>
-            <a:r>
-              <a:rPr lang="en-US" b="1" dirty="0"/>
-              <a:t>Behavior</a:t>
-            </a:r>
-            <a:r>
-              <a:rPr lang="en-US" dirty="0"/>
-              <a:t>:</a:t>
-            </a:r>
-          </a:p>
-          <a:p>
-            <a:pPr marL="0" indent="0">
-              <a:buFont typeface="Arial" panose="020B0604020202020204" pitchFamily="34" charset="0"/>
-              <a:buNone/>
-            </a:pPr>
-            <a:r>
-              <a:rPr lang="en-US" dirty="0"/>
-              <a:t>Verify that a method was (not) called, or called with specific arguments.</a:t>
-            </a:r>
+            <a:endParaRPr lang="en-BE" dirty="0"/>
           </a:p>
         </p:txBody>
       </p:sp>
@@ -1320,7 +1320,7 @@
     </p:spTree>
     <p:extLst>
       <p:ext uri="{BB962C8B-B14F-4D97-AF65-F5344CB8AC3E}">
-        <p14:creationId xmlns:p14="http://schemas.microsoft.com/office/powerpoint/2010/main" val="1592903963"/>
+        <p14:creationId xmlns:p14="http://schemas.microsoft.com/office/powerpoint/2010/main" val="4101160565"/>
       </p:ext>
     </p:extLst>
   </p:cSld>
@@ -5993,7 +5993,7 @@
             <a:fld id="{B61BEF0D-F0BB-DE4B-95CE-6DB70DBA9567}" type="datetimeFigureOut">
               <a:rPr lang="en-US" dirty="0"/>
               <a:pPr/>
-              <a:t>8/25/2022</a:t>
+              <a:t>3/6/2024</a:t>
             </a:fld>
             <a:endParaRPr lang="en-US" dirty="0"/>
           </a:p>
@@ -6281,7 +6281,7 @@
             <a:fld id="{B61BEF0D-F0BB-DE4B-95CE-6DB70DBA9567}" type="datetimeFigureOut">
               <a:rPr lang="en-US" dirty="0"/>
               <a:pPr/>
-              <a:t>8/25/2022</a:t>
+              <a:t>3/6/2024</a:t>
             </a:fld>
             <a:endParaRPr lang="en-US" dirty="0"/>
           </a:p>
@@ -6526,7 +6526,7 @@
             <a:fld id="{B61BEF0D-F0BB-DE4B-95CE-6DB70DBA9567}" type="datetimeFigureOut">
               <a:rPr lang="en-US" dirty="0"/>
               <a:pPr/>
-              <a:t>8/25/2022</a:t>
+              <a:t>3/6/2024</a:t>
             </a:fld>
             <a:endParaRPr lang="en-US" dirty="0"/>
           </a:p>
@@ -7059,7 +7059,7 @@
             <a:fld id="{B61BEF0D-F0BB-DE4B-95CE-6DB70DBA9567}" type="datetimeFigureOut">
               <a:rPr lang="en-US" dirty="0"/>
               <a:pPr/>
-              <a:t>8/25/2022</a:t>
+              <a:t>3/6/2024</a:t>
             </a:fld>
             <a:endParaRPr lang="en-US" dirty="0"/>
           </a:p>
@@ -7304,7 +7304,7 @@
             <a:fld id="{B61BEF0D-F0BB-DE4B-95CE-6DB70DBA9567}" type="datetimeFigureOut">
               <a:rPr lang="en-US" dirty="0"/>
               <a:pPr/>
-              <a:t>8/25/2022</a:t>
+              <a:t>3/6/2024</a:t>
             </a:fld>
             <a:endParaRPr lang="en-US" dirty="0"/>
           </a:p>
@@ -7844,7 +7844,7 @@
             <a:fld id="{B61BEF0D-F0BB-DE4B-95CE-6DB70DBA9567}" type="datetimeFigureOut">
               <a:rPr lang="en-US" dirty="0"/>
               <a:pPr/>
-              <a:t>8/25/2022</a:t>
+              <a:t>3/6/2024</a:t>
             </a:fld>
             <a:endParaRPr lang="en-US" dirty="0"/>
           </a:p>
@@ -8151,7 +8151,7 @@
             <a:fld id="{B61BEF0D-F0BB-DE4B-95CE-6DB70DBA9567}" type="datetimeFigureOut">
               <a:rPr lang="en-US" dirty="0"/>
               <a:pPr/>
-              <a:t>8/25/2022</a:t>
+              <a:t>3/6/2024</a:t>
             </a:fld>
             <a:endParaRPr lang="en-US" dirty="0"/>
           </a:p>
@@ -8323,7 +8323,7 @@
             <a:fld id="{B61BEF0D-F0BB-DE4B-95CE-6DB70DBA9567}" type="datetimeFigureOut">
               <a:rPr lang="en-US" dirty="0"/>
               <a:pPr/>
-              <a:t>8/25/2022</a:t>
+              <a:t>3/6/2024</a:t>
             </a:fld>
             <a:endParaRPr lang="en-US" dirty="0"/>
           </a:p>
@@ -8500,7 +8500,7 @@
             <a:fld id="{B61BEF0D-F0BB-DE4B-95CE-6DB70DBA9567}" type="datetimeFigureOut">
               <a:rPr lang="en-US" dirty="0"/>
               <a:pPr/>
-              <a:t>8/25/2022</a:t>
+              <a:t>3/6/2024</a:t>
             </a:fld>
             <a:endParaRPr lang="en-US" dirty="0"/>
           </a:p>
@@ -8667,7 +8667,7 @@
             <a:fld id="{B61BEF0D-F0BB-DE4B-95CE-6DB70DBA9567}" type="datetimeFigureOut">
               <a:rPr lang="en-US" dirty="0"/>
               <a:pPr/>
-              <a:t>8/25/2022</a:t>
+              <a:t>3/6/2024</a:t>
             </a:fld>
             <a:endParaRPr lang="en-US" dirty="0"/>
           </a:p>
@@ -8910,7 +8910,7 @@
             <a:fld id="{B61BEF0D-F0BB-DE4B-95CE-6DB70DBA9567}" type="datetimeFigureOut">
               <a:rPr lang="en-US" dirty="0"/>
               <a:pPr/>
-              <a:t>8/25/2022</a:t>
+              <a:t>3/6/2024</a:t>
             </a:fld>
             <a:endParaRPr lang="en-US" dirty="0"/>
           </a:p>
@@ -9199,7 +9199,7 @@
             <a:fld id="{B61BEF0D-F0BB-DE4B-95CE-6DB70DBA9567}" type="datetimeFigureOut">
               <a:rPr lang="en-US" dirty="0"/>
               <a:pPr/>
-              <a:t>8/25/2022</a:t>
+              <a:t>3/6/2024</a:t>
             </a:fld>
             <a:endParaRPr lang="en-US" dirty="0"/>
           </a:p>
@@ -9626,7 +9626,7 @@
             <a:fld id="{B61BEF0D-F0BB-DE4B-95CE-6DB70DBA9567}" type="datetimeFigureOut">
               <a:rPr lang="en-US" dirty="0"/>
               <a:pPr/>
-              <a:t>8/25/2022</a:t>
+              <a:t>3/6/2024</a:t>
             </a:fld>
             <a:endParaRPr lang="en-US" dirty="0"/>
           </a:p>
@@ -9746,7 +9746,7 @@
             <a:fld id="{B61BEF0D-F0BB-DE4B-95CE-6DB70DBA9567}" type="datetimeFigureOut">
               <a:rPr lang="en-US" dirty="0"/>
               <a:pPr/>
-              <a:t>8/25/2022</a:t>
+              <a:t>3/6/2024</a:t>
             </a:fld>
             <a:endParaRPr lang="en-US" dirty="0"/>
           </a:p>
@@ -9838,7 +9838,7 @@
             <a:fld id="{B61BEF0D-F0BB-DE4B-95CE-6DB70DBA9567}" type="datetimeFigureOut">
               <a:rPr lang="en-US" dirty="0"/>
               <a:pPr/>
-              <a:t>8/25/2022</a:t>
+              <a:t>3/6/2024</a:t>
             </a:fld>
             <a:endParaRPr lang="en-US" dirty="0"/>
           </a:p>
@@ -10118,7 +10118,7 @@
             <a:fld id="{B61BEF0D-F0BB-DE4B-95CE-6DB70DBA9567}" type="datetimeFigureOut">
               <a:rPr lang="en-US" dirty="0"/>
               <a:pPr/>
-              <a:t>8/25/2022</a:t>
+              <a:t>3/6/2024</a:t>
             </a:fld>
             <a:endParaRPr lang="en-US" dirty="0"/>
           </a:p>
@@ -10406,7 +10406,7 @@
             <a:fld id="{B61BEF0D-F0BB-DE4B-95CE-6DB70DBA9567}" type="datetimeFigureOut">
               <a:rPr lang="en-US" dirty="0"/>
               <a:pPr/>
-              <a:t>8/25/2022</a:t>
+              <a:t>3/6/2024</a:t>
             </a:fld>
             <a:endParaRPr lang="en-US" dirty="0"/>
           </a:p>
@@ -10634,7 +10634,7 @@
             <a:fld id="{B61BEF0D-F0BB-DE4B-95CE-6DB70DBA9567}" type="datetimeFigureOut">
               <a:rPr lang="en-US" dirty="0"/>
               <a:pPr/>
-              <a:t>8/25/2022</a:t>
+              <a:t>3/6/2024</a:t>
             </a:fld>
             <a:endParaRPr lang="en-US" dirty="0"/>
           </a:p>
@@ -11555,6 +11555,261 @@
           </a:p>
         </p:txBody>
       </p:sp>
+      <p:sp>
+        <p:nvSpPr>
+          <p:cNvPr id="2" name="Rectangle: Rounded Corners 1">
+            <a:extLst>
+              <a:ext uri="{FF2B5EF4-FFF2-40B4-BE49-F238E27FC236}">
+                <a16:creationId xmlns:a16="http://schemas.microsoft.com/office/drawing/2014/main" id="{AC6287BB-437C-DC46-D529-0B9F90CCF852}"/>
+              </a:ext>
+            </a:extLst>
+          </p:cNvPr>
+          <p:cNvSpPr/>
+          <p:nvPr/>
+        </p:nvSpPr>
+        <p:spPr>
+          <a:xfrm>
+            <a:off x="9775774" y="6336516"/>
+            <a:ext cx="2357042" cy="409737"/>
+          </a:xfrm>
+          <a:prstGeom prst="roundRect">
+            <a:avLst/>
+          </a:prstGeom>
+        </p:spPr>
+        <p:style>
+          <a:lnRef idx="2">
+            <a:schemeClr val="accent1">
+              <a:shade val="50000"/>
+            </a:schemeClr>
+          </a:lnRef>
+          <a:fillRef idx="1">
+            <a:schemeClr val="accent1"/>
+          </a:fillRef>
+          <a:effectRef idx="0">
+            <a:schemeClr val="accent1"/>
+          </a:effectRef>
+          <a:fontRef idx="minor">
+            <a:schemeClr val="lt1"/>
+          </a:fontRef>
+        </p:style>
+        <p:txBody>
+          <a:bodyPr rtlCol="0" anchor="ctr"/>
+          <a:lstStyle/>
+          <a:p>
+            <a:pPr algn="ctr"/>
+            <a:r>
+              <a:rPr lang="en-US" dirty="0" err="1"/>
+              <a:t>ArchitectureTrack</a:t>
+            </a:r>
+            <a:endParaRPr lang="en-BE" dirty="0"/>
+          </a:p>
+        </p:txBody>
+      </p:sp>
+      <p:sp>
+        <p:nvSpPr>
+          <p:cNvPr id="3" name="Rectangle 2">
+            <a:extLst>
+              <a:ext uri="{FF2B5EF4-FFF2-40B4-BE49-F238E27FC236}">
+                <a16:creationId xmlns:a16="http://schemas.microsoft.com/office/drawing/2014/main" id="{29175DD1-5BBD-D3E2-A8BA-2C33988FD451}"/>
+              </a:ext>
+            </a:extLst>
+          </p:cNvPr>
+          <p:cNvSpPr/>
+          <p:nvPr/>
+        </p:nvSpPr>
+        <p:spPr>
+          <a:xfrm>
+            <a:off x="103789" y="5720903"/>
+            <a:ext cx="1846957" cy="441793"/>
+          </a:xfrm>
+          <a:prstGeom prst="rect">
+            <a:avLst/>
+          </a:prstGeom>
+        </p:spPr>
+        <p:style>
+          <a:lnRef idx="2">
+            <a:schemeClr val="accent6">
+              <a:shade val="50000"/>
+            </a:schemeClr>
+          </a:lnRef>
+          <a:fillRef idx="1">
+            <a:schemeClr val="accent6"/>
+          </a:fillRef>
+          <a:effectRef idx="0">
+            <a:schemeClr val="accent6"/>
+          </a:effectRef>
+          <a:fontRef idx="minor">
+            <a:schemeClr val="lt1"/>
+          </a:fontRef>
+        </p:style>
+        <p:txBody>
+          <a:bodyPr rtlCol="0" anchor="ctr"/>
+          <a:lstStyle/>
+          <a:p>
+            <a:pPr algn="ctr"/>
+            <a:r>
+              <a:rPr lang="fr-BE" dirty="0" err="1"/>
+              <a:t>Theoretical</a:t>
+            </a:r>
+            <a:endParaRPr lang="en-BE" dirty="0"/>
+          </a:p>
+        </p:txBody>
+      </p:sp>
+      <p:sp>
+        <p:nvSpPr>
+          <p:cNvPr id="7" name="Rectangle 6">
+            <a:extLst>
+              <a:ext uri="{FF2B5EF4-FFF2-40B4-BE49-F238E27FC236}">
+                <a16:creationId xmlns:a16="http://schemas.microsoft.com/office/drawing/2014/main" id="{14127FD2-6362-DB53-198B-CFC87BB4E808}"/>
+              </a:ext>
+            </a:extLst>
+          </p:cNvPr>
+          <p:cNvSpPr/>
+          <p:nvPr/>
+        </p:nvSpPr>
+        <p:spPr>
+          <a:xfrm>
+            <a:off x="103789" y="6255659"/>
+            <a:ext cx="1846957" cy="441793"/>
+          </a:xfrm>
+          <a:prstGeom prst="rect">
+            <a:avLst/>
+          </a:prstGeom>
+        </p:spPr>
+        <p:style>
+          <a:lnRef idx="2">
+            <a:schemeClr val="accent4">
+              <a:shade val="50000"/>
+            </a:schemeClr>
+          </a:lnRef>
+          <a:fillRef idx="1">
+            <a:schemeClr val="accent4"/>
+          </a:fillRef>
+          <a:effectRef idx="0">
+            <a:schemeClr val="accent4"/>
+          </a:effectRef>
+          <a:fontRef idx="minor">
+            <a:schemeClr val="lt1"/>
+          </a:fontRef>
+        </p:style>
+        <p:txBody>
+          <a:bodyPr rtlCol="0" anchor="ctr"/>
+          <a:lstStyle/>
+          <a:p>
+            <a:pPr algn="ctr"/>
+            <a:r>
+              <a:rPr lang="fr-BE" dirty="0"/>
+              <a:t>Introduction</a:t>
+            </a:r>
+            <a:endParaRPr lang="en-BE" dirty="0"/>
+          </a:p>
+        </p:txBody>
+      </p:sp>
+      <p:sp>
+        <p:nvSpPr>
+          <p:cNvPr id="9" name="TextBox 8">
+            <a:extLst>
+              <a:ext uri="{FF2B5EF4-FFF2-40B4-BE49-F238E27FC236}">
+                <a16:creationId xmlns:a16="http://schemas.microsoft.com/office/drawing/2014/main" id="{C41CD924-5C90-4C62-8CD8-11B747175BCF}"/>
+              </a:ext>
+            </a:extLst>
+          </p:cNvPr>
+          <p:cNvSpPr txBox="1"/>
+          <p:nvPr/>
+        </p:nvSpPr>
+        <p:spPr>
+          <a:xfrm>
+            <a:off x="11327281" y="263415"/>
+            <a:ext cx="736980" cy="595932"/>
+          </a:xfrm>
+          <a:prstGeom prst="rect">
+            <a:avLst/>
+          </a:prstGeom>
+          <a:noFill/>
+        </p:spPr>
+        <p:txBody>
+          <a:bodyPr wrap="square" rtlCol="0">
+            <a:spAutoFit/>
+          </a:bodyPr>
+          <a:lstStyle/>
+          <a:p>
+            <a:pPr lvl="0">
+              <a:lnSpc>
+                <a:spcPct val="107000"/>
+              </a:lnSpc>
+            </a:pPr>
+            <a:r>
+              <a:rPr lang="en-US" sz="3200" dirty="0">
+                <a:latin typeface="Calibri" panose="020F0502020204030204" pitchFamily="34" charset="0"/>
+                <a:ea typeface="Calibri" panose="020F0502020204030204" pitchFamily="34" charset="0"/>
+                <a:cs typeface="Times New Roman" panose="02020603050405020304" pitchFamily="18" charset="0"/>
+              </a:rPr>
+              <a:t>?</a:t>
+            </a:r>
+            <a:r>
+              <a:rPr lang="en-US" sz="3200">
+                <a:latin typeface="Calibri" panose="020F0502020204030204" pitchFamily="34" charset="0"/>
+                <a:ea typeface="Calibri" panose="020F0502020204030204" pitchFamily="34" charset="0"/>
+                <a:cs typeface="Times New Roman" panose="02020603050405020304" pitchFamily="18" charset="0"/>
+              </a:rPr>
+              <a:t>h</a:t>
+            </a:r>
+            <a:endParaRPr lang="en-BE" sz="3200" dirty="0">
+              <a:effectLst/>
+              <a:latin typeface="Calibri" panose="020F0502020204030204" pitchFamily="34" charset="0"/>
+              <a:ea typeface="Calibri" panose="020F0502020204030204" pitchFamily="34" charset="0"/>
+              <a:cs typeface="Times New Roman" panose="02020603050405020304" pitchFamily="18" charset="0"/>
+            </a:endParaRPr>
+          </a:p>
+        </p:txBody>
+      </p:sp>
+      <p:pic>
+        <p:nvPicPr>
+          <p:cNvPr id="10" name="Picture 2" descr="Clock PNG, Clock Transparent Background - FreeIconsPNG">
+            <a:extLst>
+              <a:ext uri="{FF2B5EF4-FFF2-40B4-BE49-F238E27FC236}">
+                <a16:creationId xmlns:a16="http://schemas.microsoft.com/office/drawing/2014/main" id="{89ABC115-B3D4-4CF8-9017-BF92F15AB44E}"/>
+              </a:ext>
+            </a:extLst>
+          </p:cNvPr>
+          <p:cNvPicPr>
+            <a:picLocks noChangeAspect="1" noChangeArrowheads="1"/>
+          </p:cNvPicPr>
+          <p:nvPr/>
+        </p:nvPicPr>
+        <p:blipFill>
+          <a:blip r:embed="rId6">
+            <a:extLst>
+              <a:ext uri="{28A0092B-C50C-407E-A947-70E740481C1C}">
+                <a14:useLocalDpi xmlns:a14="http://schemas.microsoft.com/office/drawing/2010/main" val="0"/>
+              </a:ext>
+            </a:extLst>
+          </a:blip>
+          <a:srcRect/>
+          <a:stretch>
+            <a:fillRect/>
+          </a:stretch>
+        </p:blipFill>
+        <p:spPr bwMode="auto">
+          <a:xfrm>
+            <a:off x="10467472" y="192891"/>
+            <a:ext cx="736980" cy="736980"/>
+          </a:xfrm>
+          <a:prstGeom prst="rect">
+            <a:avLst/>
+          </a:prstGeom>
+          <a:noFill/>
+          <a:extLst>
+            <a:ext uri="{909E8E84-426E-40DD-AFC4-6F175D3DCCD1}">
+              <a14:hiddenFill xmlns:a14="http://schemas.microsoft.com/office/drawing/2010/main">
+                <a:solidFill>
+                  <a:srgbClr val="FFFFFF"/>
+                </a:solidFill>
+              </a14:hiddenFill>
+            </a:ext>
+          </a:extLst>
+        </p:spPr>
+      </p:pic>
     </p:spTree>
     <p:extLst>
       <p:ext uri="{BB962C8B-B14F-4D97-AF65-F5344CB8AC3E}">
@@ -12304,6 +12559,234 @@
 </file>
 
 <file path=ppt/slides/slide13.xml><?xml version="1.0" encoding="utf-8"?>
+<p:sld xmlns:a="http://schemas.openxmlformats.org/drawingml/2006/main" xmlns:r="http://schemas.openxmlformats.org/officeDocument/2006/relationships" xmlns:p="http://schemas.openxmlformats.org/presentationml/2006/main">
+  <p:cSld>
+    <p:spTree>
+      <p:nvGrpSpPr>
+        <p:cNvPr id="1" name=""/>
+        <p:cNvGrpSpPr/>
+        <p:nvPr/>
+      </p:nvGrpSpPr>
+      <p:grpSpPr>
+        <a:xfrm>
+          <a:off x="0" y="0"/>
+          <a:ext cx="0" cy="0"/>
+          <a:chOff x="0" y="0"/>
+          <a:chExt cx="0" cy="0"/>
+        </a:xfrm>
+      </p:grpSpPr>
+      <p:pic>
+        <p:nvPicPr>
+          <p:cNvPr id="6" name="Picture 5">
+            <a:extLst>
+              <a:ext uri="{FF2B5EF4-FFF2-40B4-BE49-F238E27FC236}">
+                <a16:creationId xmlns:a16="http://schemas.microsoft.com/office/drawing/2014/main" id="{7D1150AD-E424-490F-A3E6-147D047AF505}"/>
+              </a:ext>
+            </a:extLst>
+          </p:cNvPr>
+          <p:cNvPicPr>
+            <a:picLocks noChangeAspect="1"/>
+          </p:cNvPicPr>
+          <p:nvPr>
+            <p:custDataLst>
+              <p:custData r:id="rId1"/>
+            </p:custDataLst>
+          </p:nvPr>
+        </p:nvPicPr>
+        <p:blipFill>
+          <a:blip r:embed="rId4"/>
+          <a:stretch>
+            <a:fillRect/>
+          </a:stretch>
+        </p:blipFill>
+        <p:spPr>
+          <a:xfrm>
+            <a:off x="-88884" y="-22188"/>
+            <a:ext cx="3183776" cy="860893"/>
+          </a:xfrm>
+          <a:prstGeom prst="rect">
+            <a:avLst/>
+          </a:prstGeom>
+        </p:spPr>
+      </p:pic>
+      <p:sp>
+        <p:nvSpPr>
+          <p:cNvPr id="4" name="Title 3">
+            <a:extLst>
+              <a:ext uri="{FF2B5EF4-FFF2-40B4-BE49-F238E27FC236}">
+                <a16:creationId xmlns:a16="http://schemas.microsoft.com/office/drawing/2014/main" id="{29D87857-8B86-4E40-B4FD-6ECD4DA8BEC6}"/>
+              </a:ext>
+            </a:extLst>
+          </p:cNvPr>
+          <p:cNvSpPr>
+            <a:spLocks noGrp="1"/>
+          </p:cNvSpPr>
+          <p:nvPr>
+            <p:ph type="ctrTitle"/>
+          </p:nvPr>
+        </p:nvSpPr>
+        <p:spPr>
+          <a:xfrm>
+            <a:off x="420888" y="838705"/>
+            <a:ext cx="11542512" cy="860893"/>
+          </a:xfrm>
+        </p:spPr>
+        <p:txBody>
+          <a:bodyPr/>
+          <a:lstStyle/>
+          <a:p>
+            <a:r>
+              <a:rPr lang="fr-BE" dirty="0"/>
+              <a:t>State vs </a:t>
+            </a:r>
+            <a:r>
+              <a:rPr lang="fr-BE" dirty="0" err="1"/>
+              <a:t>Behavior</a:t>
+            </a:r>
+            <a:r>
+              <a:rPr lang="fr-BE" dirty="0"/>
+              <a:t> </a:t>
+            </a:r>
+            <a:r>
+              <a:rPr lang="fr-BE" dirty="0" err="1"/>
+              <a:t>Testing</a:t>
+            </a:r>
+            <a:endParaRPr lang="en-BE" dirty="0"/>
+          </a:p>
+        </p:txBody>
+      </p:sp>
+      <p:sp>
+        <p:nvSpPr>
+          <p:cNvPr id="3" name="TextBox 2">
+            <a:extLst>
+              <a:ext uri="{FF2B5EF4-FFF2-40B4-BE49-F238E27FC236}">
+                <a16:creationId xmlns:a16="http://schemas.microsoft.com/office/drawing/2014/main" id="{8D7F2BCF-C00A-DB3B-11EB-B1FFF692D8EE}"/>
+              </a:ext>
+            </a:extLst>
+          </p:cNvPr>
+          <p:cNvSpPr txBox="1"/>
+          <p:nvPr/>
+        </p:nvSpPr>
+        <p:spPr>
+          <a:xfrm>
+            <a:off x="420888" y="1956230"/>
+            <a:ext cx="11891919" cy="3877280"/>
+          </a:xfrm>
+          <a:prstGeom prst="rect">
+            <a:avLst/>
+          </a:prstGeom>
+          <a:noFill/>
+        </p:spPr>
+        <p:txBody>
+          <a:bodyPr wrap="square" rtlCol="0">
+            <a:spAutoFit/>
+          </a:bodyPr>
+          <a:lstStyle/>
+          <a:p>
+            <a:pPr lvl="0">
+              <a:lnSpc>
+                <a:spcPct val="107000"/>
+              </a:lnSpc>
+            </a:pPr>
+            <a:r>
+              <a:rPr lang="en-US" sz="4800" b="1" dirty="0">
+                <a:effectLst/>
+                <a:latin typeface="Calibri" panose="020F0502020204030204" pitchFamily="34" charset="0"/>
+                <a:ea typeface="Calibri" panose="020F0502020204030204" pitchFamily="34" charset="0"/>
+                <a:cs typeface="Times New Roman" panose="02020603050405020304" pitchFamily="18" charset="0"/>
+              </a:rPr>
+              <a:t>State Testing:</a:t>
+            </a:r>
+            <a:br>
+              <a:rPr lang="en-US" sz="4800" dirty="0">
+                <a:effectLst/>
+                <a:latin typeface="Calibri" panose="020F0502020204030204" pitchFamily="34" charset="0"/>
+                <a:ea typeface="Calibri" panose="020F0502020204030204" pitchFamily="34" charset="0"/>
+                <a:cs typeface="Times New Roman" panose="02020603050405020304" pitchFamily="18" charset="0"/>
+              </a:rPr>
+            </a:br>
+            <a:r>
+              <a:rPr lang="en-US" sz="4000" dirty="0">
+                <a:effectLst/>
+                <a:latin typeface="Calibri" panose="020F0502020204030204" pitchFamily="34" charset="0"/>
+                <a:ea typeface="Calibri" panose="020F0502020204030204" pitchFamily="34" charset="0"/>
+                <a:cs typeface="Times New Roman" panose="02020603050405020304" pitchFamily="18" charset="0"/>
+              </a:rPr>
+              <a:t>Validate that a property has a certain value</a:t>
+            </a:r>
+            <a:endParaRPr lang="en-US" sz="4800" dirty="0">
+              <a:effectLst/>
+              <a:latin typeface="Calibri" panose="020F0502020204030204" pitchFamily="34" charset="0"/>
+              <a:ea typeface="Calibri" panose="020F0502020204030204" pitchFamily="34" charset="0"/>
+              <a:cs typeface="Times New Roman" panose="02020603050405020304" pitchFamily="18" charset="0"/>
+            </a:endParaRPr>
+          </a:p>
+          <a:p>
+            <a:pPr lvl="0">
+              <a:lnSpc>
+                <a:spcPct val="107000"/>
+              </a:lnSpc>
+            </a:pPr>
+            <a:endParaRPr lang="en-US" sz="4800" dirty="0">
+              <a:effectLst/>
+              <a:latin typeface="Calibri" panose="020F0502020204030204" pitchFamily="34" charset="0"/>
+              <a:ea typeface="Calibri" panose="020F0502020204030204" pitchFamily="34" charset="0"/>
+              <a:cs typeface="Times New Roman" panose="02020603050405020304" pitchFamily="18" charset="0"/>
+            </a:endParaRPr>
+          </a:p>
+          <a:p>
+            <a:pPr lvl="0">
+              <a:lnSpc>
+                <a:spcPct val="107000"/>
+              </a:lnSpc>
+            </a:pPr>
+            <a:r>
+              <a:rPr lang="en-US" sz="4800" b="1" dirty="0">
+                <a:latin typeface="Calibri" panose="020F0502020204030204" pitchFamily="34" charset="0"/>
+                <a:ea typeface="Calibri" panose="020F0502020204030204" pitchFamily="34" charset="0"/>
+                <a:cs typeface="Times New Roman" panose="02020603050405020304" pitchFamily="18" charset="0"/>
+              </a:rPr>
+              <a:t>Behavior Testing:</a:t>
+            </a:r>
+          </a:p>
+          <a:p>
+            <a:pPr lvl="0">
+              <a:lnSpc>
+                <a:spcPct val="107000"/>
+              </a:lnSpc>
+            </a:pPr>
+            <a:r>
+              <a:rPr lang="en-US" sz="4000" dirty="0">
+                <a:effectLst/>
+                <a:latin typeface="Calibri" panose="020F0502020204030204" pitchFamily="34" charset="0"/>
+                <a:ea typeface="Calibri" panose="020F0502020204030204" pitchFamily="34" charset="0"/>
+                <a:cs typeface="Times New Roman" panose="02020603050405020304" pitchFamily="18" charset="0"/>
+              </a:rPr>
+              <a:t>Validate that a method was (not) called</a:t>
+            </a:r>
+            <a:endParaRPr lang="en-BE" sz="4000" dirty="0">
+              <a:effectLst/>
+              <a:latin typeface="Calibri" panose="020F0502020204030204" pitchFamily="34" charset="0"/>
+              <a:ea typeface="Calibri" panose="020F0502020204030204" pitchFamily="34" charset="0"/>
+              <a:cs typeface="Times New Roman" panose="02020603050405020304" pitchFamily="18" charset="0"/>
+            </a:endParaRPr>
+          </a:p>
+        </p:txBody>
+      </p:sp>
+    </p:spTree>
+    <p:extLst>
+      <p:ext uri="{BB962C8B-B14F-4D97-AF65-F5344CB8AC3E}">
+        <p14:creationId xmlns:p14="http://schemas.microsoft.com/office/powerpoint/2010/main" val="4122116230"/>
+      </p:ext>
+    </p:extLst>
+  </p:cSld>
+  <p:clrMapOvr>
+    <a:masterClrMapping/>
+  </p:clrMapOvr>
+</p:sld>
+</file>
+
+<file path=ppt/slides/slide14.xml><?xml version="1.0" encoding="utf-8"?>
 <p:sld xmlns:a="http://schemas.openxmlformats.org/drawingml/2006/main" xmlns:r="http://schemas.openxmlformats.org/officeDocument/2006/relationships" xmlns:p="http://schemas.openxmlformats.org/presentationml/2006/main">
   <p:cSld>
     <p:spTree>
@@ -12439,234 +12922,6 @@
     <p:extLst>
       <p:ext uri="{BB962C8B-B14F-4D97-AF65-F5344CB8AC3E}">
         <p14:creationId xmlns:p14="http://schemas.microsoft.com/office/powerpoint/2010/main" val="1824995197"/>
-      </p:ext>
-    </p:extLst>
-  </p:cSld>
-  <p:clrMapOvr>
-    <a:masterClrMapping/>
-  </p:clrMapOvr>
-</p:sld>
-</file>
-
-<file path=ppt/slides/slide14.xml><?xml version="1.0" encoding="utf-8"?>
-<p:sld xmlns:a="http://schemas.openxmlformats.org/drawingml/2006/main" xmlns:r="http://schemas.openxmlformats.org/officeDocument/2006/relationships" xmlns:p="http://schemas.openxmlformats.org/presentationml/2006/main">
-  <p:cSld>
-    <p:spTree>
-      <p:nvGrpSpPr>
-        <p:cNvPr id="1" name=""/>
-        <p:cNvGrpSpPr/>
-        <p:nvPr/>
-      </p:nvGrpSpPr>
-      <p:grpSpPr>
-        <a:xfrm>
-          <a:off x="0" y="0"/>
-          <a:ext cx="0" cy="0"/>
-          <a:chOff x="0" y="0"/>
-          <a:chExt cx="0" cy="0"/>
-        </a:xfrm>
-      </p:grpSpPr>
-      <p:pic>
-        <p:nvPicPr>
-          <p:cNvPr id="6" name="Picture 5">
-            <a:extLst>
-              <a:ext uri="{FF2B5EF4-FFF2-40B4-BE49-F238E27FC236}">
-                <a16:creationId xmlns:a16="http://schemas.microsoft.com/office/drawing/2014/main" id="{7D1150AD-E424-490F-A3E6-147D047AF505}"/>
-              </a:ext>
-            </a:extLst>
-          </p:cNvPr>
-          <p:cNvPicPr>
-            <a:picLocks noChangeAspect="1"/>
-          </p:cNvPicPr>
-          <p:nvPr>
-            <p:custDataLst>
-              <p:custData r:id="rId1"/>
-            </p:custDataLst>
-          </p:nvPr>
-        </p:nvPicPr>
-        <p:blipFill>
-          <a:blip r:embed="rId4"/>
-          <a:stretch>
-            <a:fillRect/>
-          </a:stretch>
-        </p:blipFill>
-        <p:spPr>
-          <a:xfrm>
-            <a:off x="-88884" y="-22188"/>
-            <a:ext cx="3183776" cy="860893"/>
-          </a:xfrm>
-          <a:prstGeom prst="rect">
-            <a:avLst/>
-          </a:prstGeom>
-        </p:spPr>
-      </p:pic>
-      <p:sp>
-        <p:nvSpPr>
-          <p:cNvPr id="4" name="Title 3">
-            <a:extLst>
-              <a:ext uri="{FF2B5EF4-FFF2-40B4-BE49-F238E27FC236}">
-                <a16:creationId xmlns:a16="http://schemas.microsoft.com/office/drawing/2014/main" id="{29D87857-8B86-4E40-B4FD-6ECD4DA8BEC6}"/>
-              </a:ext>
-            </a:extLst>
-          </p:cNvPr>
-          <p:cNvSpPr>
-            <a:spLocks noGrp="1"/>
-          </p:cNvSpPr>
-          <p:nvPr>
-            <p:ph type="ctrTitle"/>
-          </p:nvPr>
-        </p:nvSpPr>
-        <p:spPr>
-          <a:xfrm>
-            <a:off x="420888" y="838705"/>
-            <a:ext cx="11542512" cy="860893"/>
-          </a:xfrm>
-        </p:spPr>
-        <p:txBody>
-          <a:bodyPr/>
-          <a:lstStyle/>
-          <a:p>
-            <a:r>
-              <a:rPr lang="fr-BE" dirty="0"/>
-              <a:t>State vs </a:t>
-            </a:r>
-            <a:r>
-              <a:rPr lang="fr-BE" dirty="0" err="1"/>
-              <a:t>Behavior</a:t>
-            </a:r>
-            <a:r>
-              <a:rPr lang="fr-BE" dirty="0"/>
-              <a:t> </a:t>
-            </a:r>
-            <a:r>
-              <a:rPr lang="fr-BE" dirty="0" err="1"/>
-              <a:t>Testing</a:t>
-            </a:r>
-            <a:endParaRPr lang="en-BE" dirty="0"/>
-          </a:p>
-        </p:txBody>
-      </p:sp>
-      <p:sp>
-        <p:nvSpPr>
-          <p:cNvPr id="3" name="TextBox 2">
-            <a:extLst>
-              <a:ext uri="{FF2B5EF4-FFF2-40B4-BE49-F238E27FC236}">
-                <a16:creationId xmlns:a16="http://schemas.microsoft.com/office/drawing/2014/main" id="{8D7F2BCF-C00A-DB3B-11EB-B1FFF692D8EE}"/>
-              </a:ext>
-            </a:extLst>
-          </p:cNvPr>
-          <p:cNvSpPr txBox="1"/>
-          <p:nvPr/>
-        </p:nvSpPr>
-        <p:spPr>
-          <a:xfrm>
-            <a:off x="420888" y="1956230"/>
-            <a:ext cx="11891919" cy="3877280"/>
-          </a:xfrm>
-          <a:prstGeom prst="rect">
-            <a:avLst/>
-          </a:prstGeom>
-          <a:noFill/>
-        </p:spPr>
-        <p:txBody>
-          <a:bodyPr wrap="square" rtlCol="0">
-            <a:spAutoFit/>
-          </a:bodyPr>
-          <a:lstStyle/>
-          <a:p>
-            <a:pPr lvl="0">
-              <a:lnSpc>
-                <a:spcPct val="107000"/>
-              </a:lnSpc>
-            </a:pPr>
-            <a:r>
-              <a:rPr lang="en-US" sz="4800" b="1" dirty="0">
-                <a:effectLst/>
-                <a:latin typeface="Calibri" panose="020F0502020204030204" pitchFamily="34" charset="0"/>
-                <a:ea typeface="Calibri" panose="020F0502020204030204" pitchFamily="34" charset="0"/>
-                <a:cs typeface="Times New Roman" panose="02020603050405020304" pitchFamily="18" charset="0"/>
-              </a:rPr>
-              <a:t>State Testing:</a:t>
-            </a:r>
-            <a:br>
-              <a:rPr lang="en-US" sz="4800" dirty="0">
-                <a:effectLst/>
-                <a:latin typeface="Calibri" panose="020F0502020204030204" pitchFamily="34" charset="0"/>
-                <a:ea typeface="Calibri" panose="020F0502020204030204" pitchFamily="34" charset="0"/>
-                <a:cs typeface="Times New Roman" panose="02020603050405020304" pitchFamily="18" charset="0"/>
-              </a:rPr>
-            </a:br>
-            <a:r>
-              <a:rPr lang="en-US" sz="4000" dirty="0">
-                <a:effectLst/>
-                <a:latin typeface="Calibri" panose="020F0502020204030204" pitchFamily="34" charset="0"/>
-                <a:ea typeface="Calibri" panose="020F0502020204030204" pitchFamily="34" charset="0"/>
-                <a:cs typeface="Times New Roman" panose="02020603050405020304" pitchFamily="18" charset="0"/>
-              </a:rPr>
-              <a:t>Validate that a property has a certain value</a:t>
-            </a:r>
-            <a:endParaRPr lang="en-US" sz="4800" dirty="0">
-              <a:effectLst/>
-              <a:latin typeface="Calibri" panose="020F0502020204030204" pitchFamily="34" charset="0"/>
-              <a:ea typeface="Calibri" panose="020F0502020204030204" pitchFamily="34" charset="0"/>
-              <a:cs typeface="Times New Roman" panose="02020603050405020304" pitchFamily="18" charset="0"/>
-            </a:endParaRPr>
-          </a:p>
-          <a:p>
-            <a:pPr lvl="0">
-              <a:lnSpc>
-                <a:spcPct val="107000"/>
-              </a:lnSpc>
-            </a:pPr>
-            <a:endParaRPr lang="en-US" sz="4800" dirty="0">
-              <a:effectLst/>
-              <a:latin typeface="Calibri" panose="020F0502020204030204" pitchFamily="34" charset="0"/>
-              <a:ea typeface="Calibri" panose="020F0502020204030204" pitchFamily="34" charset="0"/>
-              <a:cs typeface="Times New Roman" panose="02020603050405020304" pitchFamily="18" charset="0"/>
-            </a:endParaRPr>
-          </a:p>
-          <a:p>
-            <a:pPr lvl="0">
-              <a:lnSpc>
-                <a:spcPct val="107000"/>
-              </a:lnSpc>
-            </a:pPr>
-            <a:r>
-              <a:rPr lang="en-US" sz="4800" b="1" dirty="0">
-                <a:latin typeface="Calibri" panose="020F0502020204030204" pitchFamily="34" charset="0"/>
-                <a:ea typeface="Calibri" panose="020F0502020204030204" pitchFamily="34" charset="0"/>
-                <a:cs typeface="Times New Roman" panose="02020603050405020304" pitchFamily="18" charset="0"/>
-              </a:rPr>
-              <a:t>Behavior Testing:</a:t>
-            </a:r>
-          </a:p>
-          <a:p>
-            <a:pPr lvl="0">
-              <a:lnSpc>
-                <a:spcPct val="107000"/>
-              </a:lnSpc>
-            </a:pPr>
-            <a:r>
-              <a:rPr lang="en-US" sz="4000" dirty="0">
-                <a:effectLst/>
-                <a:latin typeface="Calibri" panose="020F0502020204030204" pitchFamily="34" charset="0"/>
-                <a:ea typeface="Calibri" panose="020F0502020204030204" pitchFamily="34" charset="0"/>
-                <a:cs typeface="Times New Roman" panose="02020603050405020304" pitchFamily="18" charset="0"/>
-              </a:rPr>
-              <a:t>Validate that a method was (not) called</a:t>
-            </a:r>
-            <a:endParaRPr lang="en-BE" sz="4000" dirty="0">
-              <a:effectLst/>
-              <a:latin typeface="Calibri" panose="020F0502020204030204" pitchFamily="34" charset="0"/>
-              <a:ea typeface="Calibri" panose="020F0502020204030204" pitchFamily="34" charset="0"/>
-              <a:cs typeface="Times New Roman" panose="02020603050405020304" pitchFamily="18" charset="0"/>
-            </a:endParaRPr>
-          </a:p>
-        </p:txBody>
-      </p:sp>
-    </p:spTree>
-    <p:extLst>
-      <p:ext uri="{BB962C8B-B14F-4D97-AF65-F5344CB8AC3E}">
-        <p14:creationId xmlns:p14="http://schemas.microsoft.com/office/powerpoint/2010/main" val="4122116230"/>
       </p:ext>
     </p:extLst>
   </p:cSld>
@@ -19298,6 +19553,14 @@
 </file>
 
 <file path=customXml/itemProps1.xml><?xml version="1.0" encoding="utf-8"?>
+<ds:datastoreItem xmlns:ds="http://schemas.openxmlformats.org/officeDocument/2006/customXml" ds:itemID="{4A94AC37-B8C6-4C7A-80FD-1BB83E59137C}">
+  <ds:schemaRefs>
+    <ds:schemaRef ds:uri="http://schemas.microsoft.com/VisualStudio/2011/storyboarding/control"/>
+  </ds:schemaRefs>
+</ds:datastoreItem>
+</file>
+
+<file path=customXml/itemProps10.xml><?xml version="1.0" encoding="utf-8"?>
 <ds:datastoreItem xmlns:ds="http://schemas.openxmlformats.org/officeDocument/2006/customXml" ds:itemID="{787285B2-73EA-450E-8BD1-A7D5248937C3}">
   <ds:schemaRefs>
     <ds:schemaRef ds:uri="http://schemas.microsoft.com/VisualStudio/2011/storyboarding/control"/>
@@ -19305,7 +19568,207 @@
 </ds:datastoreItem>
 </file>
 
-<file path=customXml/itemProps10.xml><?xml version="1.0" encoding="utf-8"?>
+<file path=customXml/itemProps11.xml><?xml version="1.0" encoding="utf-8"?>
+<ds:datastoreItem xmlns:ds="http://schemas.openxmlformats.org/officeDocument/2006/customXml" ds:itemID="{ED5250E8-1F5D-4866-AE6A-F77DB7393982}">
+  <ds:schemaRefs>
+    <ds:schemaRef ds:uri="http://schemas.microsoft.com/VisualStudio/2011/storyboarding/control"/>
+  </ds:schemaRefs>
+</ds:datastoreItem>
+</file>
+
+<file path=customXml/itemProps12.xml><?xml version="1.0" encoding="utf-8"?>
+<ds:datastoreItem xmlns:ds="http://schemas.openxmlformats.org/officeDocument/2006/customXml" ds:itemID="{E8D58784-6638-42AD-B156-E7A3D4C8BF62}">
+  <ds:schemaRefs>
+    <ds:schemaRef ds:uri="http://schemas.microsoft.com/VisualStudio/2011/storyboarding/control"/>
+  </ds:schemaRefs>
+</ds:datastoreItem>
+</file>
+
+<file path=customXml/itemProps13.xml><?xml version="1.0" encoding="utf-8"?>
+<ds:datastoreItem xmlns:ds="http://schemas.openxmlformats.org/officeDocument/2006/customXml" ds:itemID="{68FE2DF9-B445-4C6D-94AE-B9AC0C91A19C}">
+  <ds:schemaRefs>
+    <ds:schemaRef ds:uri="http://schemas.microsoft.com/VisualStudio/2011/storyboarding/control"/>
+  </ds:schemaRefs>
+</ds:datastoreItem>
+</file>
+
+<file path=customXml/itemProps14.xml><?xml version="1.0" encoding="utf-8"?>
+<ds:datastoreItem xmlns:ds="http://schemas.openxmlformats.org/officeDocument/2006/customXml" ds:itemID="{5F8E4B39-2514-4CA6-AF65-B4027DBFE406}">
+  <ds:schemaRefs>
+    <ds:schemaRef ds:uri="http://schemas.microsoft.com/VisualStudio/2011/storyboarding/control"/>
+  </ds:schemaRefs>
+</ds:datastoreItem>
+</file>
+
+<file path=customXml/itemProps15.xml><?xml version="1.0" encoding="utf-8"?>
+<ds:datastoreItem xmlns:ds="http://schemas.openxmlformats.org/officeDocument/2006/customXml" ds:itemID="{83121EFB-4893-415B-B7BD-F940E893B2BD}">
+  <ds:schemaRefs>
+    <ds:schemaRef ds:uri="http://schemas.microsoft.com/VisualStudio/2011/storyboarding/control"/>
+  </ds:schemaRefs>
+</ds:datastoreItem>
+</file>
+
+<file path=customXml/itemProps16.xml><?xml version="1.0" encoding="utf-8"?>
+<ds:datastoreItem xmlns:ds="http://schemas.openxmlformats.org/officeDocument/2006/customXml" ds:itemID="{604E9F94-A623-400F-85C1-C263D07559AD}">
+  <ds:schemaRefs>
+    <ds:schemaRef ds:uri="http://schemas.microsoft.com/VisualStudio/2011/storyboarding/control"/>
+  </ds:schemaRefs>
+</ds:datastoreItem>
+</file>
+
+<file path=customXml/itemProps17.xml><?xml version="1.0" encoding="utf-8"?>
+<ds:datastoreItem xmlns:ds="http://schemas.openxmlformats.org/officeDocument/2006/customXml" ds:itemID="{18A09104-CC72-4E98-8540-170620C1745A}">
+  <ds:schemaRefs>
+    <ds:schemaRef ds:uri="http://schemas.microsoft.com/VisualStudio/2011/storyboarding/control"/>
+  </ds:schemaRefs>
+</ds:datastoreItem>
+</file>
+
+<file path=customXml/itemProps18.xml><?xml version="1.0" encoding="utf-8"?>
+<ds:datastoreItem xmlns:ds="http://schemas.openxmlformats.org/officeDocument/2006/customXml" ds:itemID="{57451104-4D84-400D-AAA1-27F07EAC0B3E}">
+  <ds:schemaRefs>
+    <ds:schemaRef ds:uri="http://schemas.microsoft.com/VisualStudio/2011/storyboarding/control"/>
+  </ds:schemaRefs>
+</ds:datastoreItem>
+</file>
+
+<file path=customXml/itemProps19.xml><?xml version="1.0" encoding="utf-8"?>
+<ds:datastoreItem xmlns:ds="http://schemas.openxmlformats.org/officeDocument/2006/customXml" ds:itemID="{C9A349EB-25C0-432F-BCC6-B672C9EAA1C2}">
+  <ds:schemaRefs>
+    <ds:schemaRef ds:uri="http://schemas.microsoft.com/VisualStudio/2011/storyboarding/control"/>
+  </ds:schemaRefs>
+</ds:datastoreItem>
+</file>
+
+<file path=customXml/itemProps2.xml><?xml version="1.0" encoding="utf-8"?>
+<ds:datastoreItem xmlns:ds="http://schemas.openxmlformats.org/officeDocument/2006/customXml" ds:itemID="{602A176D-DD9A-4555-ABCE-0CAAEBDBAF6D}">
+  <ds:schemaRefs>
+    <ds:schemaRef ds:uri="http://schemas.microsoft.com/VisualStudio/2011/storyboarding/control"/>
+  </ds:schemaRefs>
+</ds:datastoreItem>
+</file>
+
+<file path=customXml/itemProps20.xml><?xml version="1.0" encoding="utf-8"?>
+<ds:datastoreItem xmlns:ds="http://schemas.openxmlformats.org/officeDocument/2006/customXml" ds:itemID="{6D07BE54-C08A-4A00-A052-09AA9FE91835}">
+  <ds:schemaRefs>
+    <ds:schemaRef ds:uri="http://schemas.microsoft.com/VisualStudio/2011/storyboarding/control"/>
+  </ds:schemaRefs>
+</ds:datastoreItem>
+</file>
+
+<file path=customXml/itemProps21.xml><?xml version="1.0" encoding="utf-8"?>
+<ds:datastoreItem xmlns:ds="http://schemas.openxmlformats.org/officeDocument/2006/customXml" ds:itemID="{538A3BA5-1461-41DE-A994-46DB681A02E1}">
+  <ds:schemaRefs>
+    <ds:schemaRef ds:uri="http://schemas.microsoft.com/VisualStudio/2011/storyboarding/control"/>
+  </ds:schemaRefs>
+</ds:datastoreItem>
+</file>
+
+<file path=customXml/itemProps22.xml><?xml version="1.0" encoding="utf-8"?>
+<ds:datastoreItem xmlns:ds="http://schemas.openxmlformats.org/officeDocument/2006/customXml" ds:itemID="{C5DF06EE-7E2D-4E11-9A5F-0160175EBC54}">
+  <ds:schemaRefs>
+    <ds:schemaRef ds:uri="http://schemas.microsoft.com/VisualStudio/2011/storyboarding/control"/>
+  </ds:schemaRefs>
+</ds:datastoreItem>
+</file>
+
+<file path=customXml/itemProps23.xml><?xml version="1.0" encoding="utf-8"?>
+<ds:datastoreItem xmlns:ds="http://schemas.openxmlformats.org/officeDocument/2006/customXml" ds:itemID="{7FD07C00-8772-4422-9EF2-C41B1EE08BC1}">
+  <ds:schemaRefs>
+    <ds:schemaRef ds:uri="http://schemas.microsoft.com/VisualStudio/2011/storyboarding/control"/>
+  </ds:schemaRefs>
+</ds:datastoreItem>
+</file>
+
+<file path=customXml/itemProps24.xml><?xml version="1.0" encoding="utf-8"?>
+<ds:datastoreItem xmlns:ds="http://schemas.openxmlformats.org/officeDocument/2006/customXml" ds:itemID="{753CD8B4-040B-4198-BB4B-EC3E69834A34}">
+  <ds:schemaRefs>
+    <ds:schemaRef ds:uri="http://schemas.microsoft.com/VisualStudio/2011/storyboarding/control"/>
+  </ds:schemaRefs>
+</ds:datastoreItem>
+</file>
+
+<file path=customXml/itemProps25.xml><?xml version="1.0" encoding="utf-8"?>
+<ds:datastoreItem xmlns:ds="http://schemas.openxmlformats.org/officeDocument/2006/customXml" ds:itemID="{DA8DFECD-CF6E-4553-8828-1176E5D29DA6}">
+  <ds:schemaRefs>
+    <ds:schemaRef ds:uri="http://schemas.microsoft.com/VisualStudio/2011/storyboarding/control"/>
+  </ds:schemaRefs>
+</ds:datastoreItem>
+</file>
+
+<file path=customXml/itemProps26.xml><?xml version="1.0" encoding="utf-8"?>
+<ds:datastoreItem xmlns:ds="http://schemas.openxmlformats.org/officeDocument/2006/customXml" ds:itemID="{D12F2BFF-C618-42A7-A799-D8722515C0FA}">
+  <ds:schemaRefs>
+    <ds:schemaRef ds:uri="http://schemas.microsoft.com/VisualStudio/2011/storyboarding/control"/>
+  </ds:schemaRefs>
+</ds:datastoreItem>
+</file>
+
+<file path=customXml/itemProps27.xml><?xml version="1.0" encoding="utf-8"?>
+<ds:datastoreItem xmlns:ds="http://schemas.openxmlformats.org/officeDocument/2006/customXml" ds:itemID="{F0F1AE6D-CE96-405A-BBB8-FBC1367D7C33}">
+  <ds:schemaRefs>
+    <ds:schemaRef ds:uri="http://schemas.microsoft.com/VisualStudio/2011/storyboarding/control"/>
+  </ds:schemaRefs>
+</ds:datastoreItem>
+</file>
+
+<file path=customXml/itemProps28.xml><?xml version="1.0" encoding="utf-8"?>
+<ds:datastoreItem xmlns:ds="http://schemas.openxmlformats.org/officeDocument/2006/customXml" ds:itemID="{39CDCB66-237D-4952-997D-4EBC8293DA25}">
+  <ds:schemaRefs>
+    <ds:schemaRef ds:uri="http://schemas.microsoft.com/VisualStudio/2011/storyboarding/control"/>
+  </ds:schemaRefs>
+</ds:datastoreItem>
+</file>
+
+<file path=customXml/itemProps29.xml><?xml version="1.0" encoding="utf-8"?>
+<ds:datastoreItem xmlns:ds="http://schemas.openxmlformats.org/officeDocument/2006/customXml" ds:itemID="{4B135E7A-A1EC-44CC-9E9A-E2232C7A5BDB}">
+  <ds:schemaRefs>
+    <ds:schemaRef ds:uri="http://schemas.microsoft.com/VisualStudio/2011/storyboarding/control"/>
+  </ds:schemaRefs>
+</ds:datastoreItem>
+</file>
+
+<file path=customXml/itemProps3.xml><?xml version="1.0" encoding="utf-8"?>
+<ds:datastoreItem xmlns:ds="http://schemas.openxmlformats.org/officeDocument/2006/customXml" ds:itemID="{27E6D0F4-73A0-421D-92D0-049E8989F9EF}">
+  <ds:schemaRefs>
+    <ds:schemaRef ds:uri="http://schemas.microsoft.com/VisualStudio/2011/storyboarding/control"/>
+  </ds:schemaRefs>
+</ds:datastoreItem>
+</file>
+
+<file path=customXml/itemProps30.xml><?xml version="1.0" encoding="utf-8"?>
+<ds:datastoreItem xmlns:ds="http://schemas.openxmlformats.org/officeDocument/2006/customXml" ds:itemID="{D4810685-38F8-4208-92FA-8B9E76143B8E}">
+  <ds:schemaRefs>
+    <ds:schemaRef ds:uri="http://schemas.microsoft.com/VisualStudio/2011/storyboarding/control"/>
+  </ds:schemaRefs>
+</ds:datastoreItem>
+</file>
+
+<file path=customXml/itemProps31.xml><?xml version="1.0" encoding="utf-8"?>
+<ds:datastoreItem xmlns:ds="http://schemas.openxmlformats.org/officeDocument/2006/customXml" ds:itemID="{370599EE-380D-4550-AD41-47FBF035B53B}">
+  <ds:schemaRefs>
+    <ds:schemaRef ds:uri="http://schemas.microsoft.com/VisualStudio/2011/storyboarding/control"/>
+  </ds:schemaRefs>
+</ds:datastoreItem>
+</file>
+
+<file path=customXml/itemProps32.xml><?xml version="1.0" encoding="utf-8"?>
+<ds:datastoreItem xmlns:ds="http://schemas.openxmlformats.org/officeDocument/2006/customXml" ds:itemID="{BFA611A4-E7DD-4603-BB6A-2164CBF6DB8C}">
+  <ds:schemaRefs>
+    <ds:schemaRef ds:uri="http://schemas.microsoft.com/VisualStudio/2011/storyboarding/control"/>
+  </ds:schemaRefs>
+</ds:datastoreItem>
+</file>
+
+<file path=customXml/itemProps33.xml><?xml version="1.0" encoding="utf-8"?>
+<ds:datastoreItem xmlns:ds="http://schemas.openxmlformats.org/officeDocument/2006/customXml" ds:itemID="{0848ACBE-87D0-4803-BD51-9B04C838E1C7}">
+  <ds:schemaRefs>
+    <ds:schemaRef ds:uri="http://schemas.microsoft.com/VisualStudio/2011/storyboarding/control"/>
+  </ds:schemaRefs>
+</ds:datastoreItem>
+</file>
+
+<file path=customXml/itemProps4.xml><?xml version="1.0" encoding="utf-8"?>
 <ds:datastoreItem xmlns:ds="http://schemas.openxmlformats.org/officeDocument/2006/customXml" ds:itemID="{C8E92FC1-ACA4-4D24-98DC-65503334C51B}">
   <ds:schemaRefs>
     <ds:schemaRef ds:uri="http://schemas.microsoft.com/VisualStudio/2011/storyboarding/control"/>
@@ -19313,63 +19776,7 @@
 </ds:datastoreItem>
 </file>
 
-<file path=customXml/itemProps11.xml><?xml version="1.0" encoding="utf-8"?>
-<ds:datastoreItem xmlns:ds="http://schemas.openxmlformats.org/officeDocument/2006/customXml" ds:itemID="{5F8E4B39-2514-4CA6-AF65-B4027DBFE406}">
-  <ds:schemaRefs>
-    <ds:schemaRef ds:uri="http://schemas.microsoft.com/VisualStudio/2011/storyboarding/control"/>
-  </ds:schemaRefs>
-</ds:datastoreItem>
-</file>
-
-<file path=customXml/itemProps12.xml><?xml version="1.0" encoding="utf-8"?>
-<ds:datastoreItem xmlns:ds="http://schemas.openxmlformats.org/officeDocument/2006/customXml" ds:itemID="{154FACEB-F3BF-4191-AE2E-67A5B5DFFA27}">
-  <ds:schemaRefs>
-    <ds:schemaRef ds:uri="http://schemas.microsoft.com/VisualStudio/2011/storyboarding/control"/>
-  </ds:schemaRefs>
-</ds:datastoreItem>
-</file>
-
-<file path=customXml/itemProps13.xml><?xml version="1.0" encoding="utf-8"?>
-<ds:datastoreItem xmlns:ds="http://schemas.openxmlformats.org/officeDocument/2006/customXml" ds:itemID="{DA8DFECD-CF6E-4553-8828-1176E5D29DA6}">
-  <ds:schemaRefs>
-    <ds:schemaRef ds:uri="http://schemas.microsoft.com/VisualStudio/2011/storyboarding/control"/>
-  </ds:schemaRefs>
-</ds:datastoreItem>
-</file>
-
-<file path=customXml/itemProps14.xml><?xml version="1.0" encoding="utf-8"?>
-<ds:datastoreItem xmlns:ds="http://schemas.openxmlformats.org/officeDocument/2006/customXml" ds:itemID="{83121EFB-4893-415B-B7BD-F940E893B2BD}">
-  <ds:schemaRefs>
-    <ds:schemaRef ds:uri="http://schemas.microsoft.com/VisualStudio/2011/storyboarding/control"/>
-  </ds:schemaRefs>
-</ds:datastoreItem>
-</file>
-
-<file path=customXml/itemProps15.xml><?xml version="1.0" encoding="utf-8"?>
-<ds:datastoreItem xmlns:ds="http://schemas.openxmlformats.org/officeDocument/2006/customXml" ds:itemID="{602A176D-DD9A-4555-ABCE-0CAAEBDBAF6D}">
-  <ds:schemaRefs>
-    <ds:schemaRef ds:uri="http://schemas.microsoft.com/VisualStudio/2011/storyboarding/control"/>
-  </ds:schemaRefs>
-</ds:datastoreItem>
-</file>
-
-<file path=customXml/itemProps16.xml><?xml version="1.0" encoding="utf-8"?>
-<ds:datastoreItem xmlns:ds="http://schemas.openxmlformats.org/officeDocument/2006/customXml" ds:itemID="{0848ACBE-87D0-4803-BD51-9B04C838E1C7}">
-  <ds:schemaRefs>
-    <ds:schemaRef ds:uri="http://schemas.microsoft.com/VisualStudio/2011/storyboarding/control"/>
-  </ds:schemaRefs>
-</ds:datastoreItem>
-</file>
-
-<file path=customXml/itemProps17.xml><?xml version="1.0" encoding="utf-8"?>
-<ds:datastoreItem xmlns:ds="http://schemas.openxmlformats.org/officeDocument/2006/customXml" ds:itemID="{7FD07C00-8772-4422-9EF2-C41B1EE08BC1}">
-  <ds:schemaRefs>
-    <ds:schemaRef ds:uri="http://schemas.microsoft.com/VisualStudio/2011/storyboarding/control"/>
-  </ds:schemaRefs>
-</ds:datastoreItem>
-</file>
-
-<file path=customXml/itemProps18.xml><?xml version="1.0" encoding="utf-8"?>
+<file path=customXml/itemProps5.xml><?xml version="1.0" encoding="utf-8"?>
 <ds:datastoreItem xmlns:ds="http://schemas.openxmlformats.org/officeDocument/2006/customXml" ds:itemID="{C909926A-E528-4870-B471-51E49E6FDDDA}">
   <ds:schemaRefs>
     <ds:schemaRef ds:uri="http://schemas.microsoft.com/VisualStudio/2011/storyboarding/control"/>
@@ -19377,79 +19784,15 @@
 </ds:datastoreItem>
 </file>
 
-<file path=customXml/itemProps19.xml><?xml version="1.0" encoding="utf-8"?>
-<ds:datastoreItem xmlns:ds="http://schemas.openxmlformats.org/officeDocument/2006/customXml" ds:itemID="{4A94AC37-B8C6-4C7A-80FD-1BB83E59137C}">
+<file path=customXml/itemProps6.xml><?xml version="1.0" encoding="utf-8"?>
+<ds:datastoreItem xmlns:ds="http://schemas.openxmlformats.org/officeDocument/2006/customXml" ds:itemID="{56EB5809-7D20-4256-A68D-4622C77D541A}">
   <ds:schemaRefs>
     <ds:schemaRef ds:uri="http://schemas.microsoft.com/VisualStudio/2011/storyboarding/control"/>
   </ds:schemaRefs>
 </ds:datastoreItem>
 </file>
 
-<file path=customXml/itemProps2.xml><?xml version="1.0" encoding="utf-8"?>
-<ds:datastoreItem xmlns:ds="http://schemas.openxmlformats.org/officeDocument/2006/customXml" ds:itemID="{6D07BE54-C08A-4A00-A052-09AA9FE91835}">
-  <ds:schemaRefs>
-    <ds:schemaRef ds:uri="http://schemas.microsoft.com/VisualStudio/2011/storyboarding/control"/>
-  </ds:schemaRefs>
-</ds:datastoreItem>
-</file>
-
-<file path=customXml/itemProps20.xml><?xml version="1.0" encoding="utf-8"?>
-<ds:datastoreItem xmlns:ds="http://schemas.openxmlformats.org/officeDocument/2006/customXml" ds:itemID="{4B135E7A-A1EC-44CC-9E9A-E2232C7A5BDB}">
-  <ds:schemaRefs>
-    <ds:schemaRef ds:uri="http://schemas.microsoft.com/VisualStudio/2011/storyboarding/control"/>
-  </ds:schemaRefs>
-</ds:datastoreItem>
-</file>
-
-<file path=customXml/itemProps21.xml><?xml version="1.0" encoding="utf-8"?>
-<ds:datastoreItem xmlns:ds="http://schemas.openxmlformats.org/officeDocument/2006/customXml" ds:itemID="{D4810685-38F8-4208-92FA-8B9E76143B8E}">
-  <ds:schemaRefs>
-    <ds:schemaRef ds:uri="http://schemas.microsoft.com/VisualStudio/2011/storyboarding/control"/>
-  </ds:schemaRefs>
-</ds:datastoreItem>
-</file>
-
-<file path=customXml/itemProps22.xml><?xml version="1.0" encoding="utf-8"?>
-<ds:datastoreItem xmlns:ds="http://schemas.openxmlformats.org/officeDocument/2006/customXml" ds:itemID="{F0F1AE6D-CE96-405A-BBB8-FBC1367D7C33}">
-  <ds:schemaRefs>
-    <ds:schemaRef ds:uri="http://schemas.microsoft.com/VisualStudio/2011/storyboarding/control"/>
-  </ds:schemaRefs>
-</ds:datastoreItem>
-</file>
-
-<file path=customXml/itemProps23.xml><?xml version="1.0" encoding="utf-8"?>
-<ds:datastoreItem xmlns:ds="http://schemas.openxmlformats.org/officeDocument/2006/customXml" ds:itemID="{68FE2DF9-B445-4C6D-94AE-B9AC0C91A19C}">
-  <ds:schemaRefs>
-    <ds:schemaRef ds:uri="http://schemas.microsoft.com/VisualStudio/2011/storyboarding/control"/>
-  </ds:schemaRefs>
-</ds:datastoreItem>
-</file>
-
-<file path=customXml/itemProps24.xml><?xml version="1.0" encoding="utf-8"?>
-<ds:datastoreItem xmlns:ds="http://schemas.openxmlformats.org/officeDocument/2006/customXml" ds:itemID="{39CDCB66-237D-4952-997D-4EBC8293DA25}">
-  <ds:schemaRefs>
-    <ds:schemaRef ds:uri="http://schemas.microsoft.com/VisualStudio/2011/storyboarding/control"/>
-  </ds:schemaRefs>
-</ds:datastoreItem>
-</file>
-
-<file path=customXml/itemProps25.xml><?xml version="1.0" encoding="utf-8"?>
-<ds:datastoreItem xmlns:ds="http://schemas.openxmlformats.org/officeDocument/2006/customXml" ds:itemID="{27E6D0F4-73A0-421D-92D0-049E8989F9EF}">
-  <ds:schemaRefs>
-    <ds:schemaRef ds:uri="http://schemas.microsoft.com/VisualStudio/2011/storyboarding/control"/>
-  </ds:schemaRefs>
-</ds:datastoreItem>
-</file>
-
-<file path=customXml/itemProps26.xml><?xml version="1.0" encoding="utf-8"?>
-<ds:datastoreItem xmlns:ds="http://schemas.openxmlformats.org/officeDocument/2006/customXml" ds:itemID="{57451104-4D84-400D-AAA1-27F07EAC0B3E}">
-  <ds:schemaRefs>
-    <ds:schemaRef ds:uri="http://schemas.microsoft.com/VisualStudio/2011/storyboarding/control"/>
-  </ds:schemaRefs>
-</ds:datastoreItem>
-</file>
-
-<file path=customXml/itemProps27.xml><?xml version="1.0" encoding="utf-8"?>
+<file path=customXml/itemProps7.xml><?xml version="1.0" encoding="utf-8"?>
 <ds:datastoreItem xmlns:ds="http://schemas.openxmlformats.org/officeDocument/2006/customXml" ds:itemID="{3331FA1E-2E43-48FF-A342-CCAB98704884}">
   <ds:schemaRefs>
     <ds:schemaRef ds:uri="http://schemas.microsoft.com/VisualStudio/2011/storyboarding/control"/>
@@ -19457,47 +19800,7 @@
 </ds:datastoreItem>
 </file>
 
-<file path=customXml/itemProps28.xml><?xml version="1.0" encoding="utf-8"?>
-<ds:datastoreItem xmlns:ds="http://schemas.openxmlformats.org/officeDocument/2006/customXml" ds:itemID="{D12F2BFF-C618-42A7-A799-D8722515C0FA}">
-  <ds:schemaRefs>
-    <ds:schemaRef ds:uri="http://schemas.microsoft.com/VisualStudio/2011/storyboarding/control"/>
-  </ds:schemaRefs>
-</ds:datastoreItem>
-</file>
-
-<file path=customXml/itemProps29.xml><?xml version="1.0" encoding="utf-8"?>
-<ds:datastoreItem xmlns:ds="http://schemas.openxmlformats.org/officeDocument/2006/customXml" ds:itemID="{E8D58784-6638-42AD-B156-E7A3D4C8BF62}">
-  <ds:schemaRefs>
-    <ds:schemaRef ds:uri="http://schemas.microsoft.com/VisualStudio/2011/storyboarding/control"/>
-  </ds:schemaRefs>
-</ds:datastoreItem>
-</file>
-
-<file path=customXml/itemProps3.xml><?xml version="1.0" encoding="utf-8"?>
-<ds:datastoreItem xmlns:ds="http://schemas.openxmlformats.org/officeDocument/2006/customXml" ds:itemID="{370599EE-380D-4550-AD41-47FBF035B53B}">
-  <ds:schemaRefs>
-    <ds:schemaRef ds:uri="http://schemas.microsoft.com/VisualStudio/2011/storyboarding/control"/>
-  </ds:schemaRefs>
-</ds:datastoreItem>
-</file>
-
-<file path=customXml/itemProps30.xml><?xml version="1.0" encoding="utf-8"?>
-<ds:datastoreItem xmlns:ds="http://schemas.openxmlformats.org/officeDocument/2006/customXml" ds:itemID="{C5DF06EE-7E2D-4E11-9A5F-0160175EBC54}">
-  <ds:schemaRefs>
-    <ds:schemaRef ds:uri="http://schemas.microsoft.com/VisualStudio/2011/storyboarding/control"/>
-  </ds:schemaRefs>
-</ds:datastoreItem>
-</file>
-
-<file path=customXml/itemProps31.xml><?xml version="1.0" encoding="utf-8"?>
-<ds:datastoreItem xmlns:ds="http://schemas.openxmlformats.org/officeDocument/2006/customXml" ds:itemID="{18A09104-CC72-4E98-8540-170620C1745A}">
-  <ds:schemaRefs>
-    <ds:schemaRef ds:uri="http://schemas.microsoft.com/VisualStudio/2011/storyboarding/control"/>
-  </ds:schemaRefs>
-</ds:datastoreItem>
-</file>
-
-<file path=customXml/itemProps32.xml><?xml version="1.0" encoding="utf-8"?>
+<file path=customXml/itemProps8.xml><?xml version="1.0" encoding="utf-8"?>
 <ds:datastoreItem xmlns:ds="http://schemas.openxmlformats.org/officeDocument/2006/customXml" ds:itemID="{E0DB0C50-63E4-4721-BA81-8371246A9C9E}">
   <ds:schemaRefs>
     <ds:schemaRef ds:uri="http://schemas.microsoft.com/VisualStudio/2011/storyboarding/control"/>
@@ -19505,56 +19808,8 @@
 </ds:datastoreItem>
 </file>
 
-<file path=customXml/itemProps33.xml><?xml version="1.0" encoding="utf-8"?>
-<ds:datastoreItem xmlns:ds="http://schemas.openxmlformats.org/officeDocument/2006/customXml" ds:itemID="{604E9F94-A623-400F-85C1-C263D07559AD}">
-  <ds:schemaRefs>
-    <ds:schemaRef ds:uri="http://schemas.microsoft.com/VisualStudio/2011/storyboarding/control"/>
-  </ds:schemaRefs>
-</ds:datastoreItem>
-</file>
-
-<file path=customXml/itemProps4.xml><?xml version="1.0" encoding="utf-8"?>
-<ds:datastoreItem xmlns:ds="http://schemas.openxmlformats.org/officeDocument/2006/customXml" ds:itemID="{BFA611A4-E7DD-4603-BB6A-2164CBF6DB8C}">
-  <ds:schemaRefs>
-    <ds:schemaRef ds:uri="http://schemas.microsoft.com/VisualStudio/2011/storyboarding/control"/>
-  </ds:schemaRefs>
-</ds:datastoreItem>
-</file>
-
-<file path=customXml/itemProps5.xml><?xml version="1.0" encoding="utf-8"?>
-<ds:datastoreItem xmlns:ds="http://schemas.openxmlformats.org/officeDocument/2006/customXml" ds:itemID="{538A3BA5-1461-41DE-A994-46DB681A02E1}">
-  <ds:schemaRefs>
-    <ds:schemaRef ds:uri="http://schemas.microsoft.com/VisualStudio/2011/storyboarding/control"/>
-  </ds:schemaRefs>
-</ds:datastoreItem>
-</file>
-
-<file path=customXml/itemProps6.xml><?xml version="1.0" encoding="utf-8"?>
-<ds:datastoreItem xmlns:ds="http://schemas.openxmlformats.org/officeDocument/2006/customXml" ds:itemID="{753CD8B4-040B-4198-BB4B-EC3E69834A34}">
-  <ds:schemaRefs>
-    <ds:schemaRef ds:uri="http://schemas.microsoft.com/VisualStudio/2011/storyboarding/control"/>
-  </ds:schemaRefs>
-</ds:datastoreItem>
-</file>
-
-<file path=customXml/itemProps7.xml><?xml version="1.0" encoding="utf-8"?>
-<ds:datastoreItem xmlns:ds="http://schemas.openxmlformats.org/officeDocument/2006/customXml" ds:itemID="{56EB5809-7D20-4256-A68D-4622C77D541A}">
-  <ds:schemaRefs>
-    <ds:schemaRef ds:uri="http://schemas.microsoft.com/VisualStudio/2011/storyboarding/control"/>
-  </ds:schemaRefs>
-</ds:datastoreItem>
-</file>
-
-<file path=customXml/itemProps8.xml><?xml version="1.0" encoding="utf-8"?>
-<ds:datastoreItem xmlns:ds="http://schemas.openxmlformats.org/officeDocument/2006/customXml" ds:itemID="{C9A349EB-25C0-432F-BCC6-B672C9EAA1C2}">
-  <ds:schemaRefs>
-    <ds:schemaRef ds:uri="http://schemas.microsoft.com/VisualStudio/2011/storyboarding/control"/>
-  </ds:schemaRefs>
-</ds:datastoreItem>
-</file>
-
 <file path=customXml/itemProps9.xml><?xml version="1.0" encoding="utf-8"?>
-<ds:datastoreItem xmlns:ds="http://schemas.openxmlformats.org/officeDocument/2006/customXml" ds:itemID="{ED5250E8-1F5D-4866-AE6A-F77DB7393982}">
+<ds:datastoreItem xmlns:ds="http://schemas.openxmlformats.org/officeDocument/2006/customXml" ds:itemID="{154FACEB-F3BF-4191-AE2E-67A5B5DFFA27}">
   <ds:schemaRefs>
     <ds:schemaRef ds:uri="http://schemas.microsoft.com/VisualStudio/2011/storyboarding/control"/>
   </ds:schemaRefs>

</xml_diff>